<commit_message>
update veile techno et présentation
</commit_message>
<xml_diff>
--- a/Plannification.pptx
+++ b/Plannification.pptx
@@ -220,7 +220,7 @@
           <a:p>
             <a:fld id="{238FB027-9A8F-8045-B502-6E167BAEF5E5}" type="datetimeFigureOut">
               <a:rPr lang="fr-FR" smtClean="0"/>
-              <a:t>27/03/2024</a:t>
+              <a:t>24/08/2024</a:t>
             </a:fld>
             <a:endParaRPr lang="fr-FR"/>
           </a:p>
@@ -634,7 +634,7 @@
           <a:p>
             <a:fld id="{77B41EF1-082E-9B44-8715-0E686EE35673}" type="datetimeFigureOut">
               <a:rPr lang="fr-FR" smtClean="0"/>
-              <a:t>27/03/2024</a:t>
+              <a:t>24/08/2024</a:t>
             </a:fld>
             <a:endParaRPr lang="fr-FR"/>
           </a:p>
@@ -832,7 +832,7 @@
           <a:p>
             <a:fld id="{77B41EF1-082E-9B44-8715-0E686EE35673}" type="datetimeFigureOut">
               <a:rPr lang="fr-FR" smtClean="0"/>
-              <a:t>27/03/2024</a:t>
+              <a:t>24/08/2024</a:t>
             </a:fld>
             <a:endParaRPr lang="fr-FR"/>
           </a:p>
@@ -1040,7 +1040,7 @@
           <a:p>
             <a:fld id="{77B41EF1-082E-9B44-8715-0E686EE35673}" type="datetimeFigureOut">
               <a:rPr lang="fr-FR" smtClean="0"/>
-              <a:t>27/03/2024</a:t>
+              <a:t>24/08/2024</a:t>
             </a:fld>
             <a:endParaRPr lang="fr-FR"/>
           </a:p>
@@ -1238,7 +1238,7 @@
           <a:p>
             <a:fld id="{77B41EF1-082E-9B44-8715-0E686EE35673}" type="datetimeFigureOut">
               <a:rPr lang="fr-FR" smtClean="0"/>
-              <a:t>27/03/2024</a:t>
+              <a:t>24/08/2024</a:t>
             </a:fld>
             <a:endParaRPr lang="fr-FR"/>
           </a:p>
@@ -1513,7 +1513,7 @@
           <a:p>
             <a:fld id="{77B41EF1-082E-9B44-8715-0E686EE35673}" type="datetimeFigureOut">
               <a:rPr lang="fr-FR" smtClean="0"/>
-              <a:t>27/03/2024</a:t>
+              <a:t>24/08/2024</a:t>
             </a:fld>
             <a:endParaRPr lang="fr-FR"/>
           </a:p>
@@ -1778,7 +1778,7 @@
           <a:p>
             <a:fld id="{77B41EF1-082E-9B44-8715-0E686EE35673}" type="datetimeFigureOut">
               <a:rPr lang="fr-FR" smtClean="0"/>
-              <a:t>27/03/2024</a:t>
+              <a:t>24/08/2024</a:t>
             </a:fld>
             <a:endParaRPr lang="fr-FR"/>
           </a:p>
@@ -2190,7 +2190,7 @@
           <a:p>
             <a:fld id="{77B41EF1-082E-9B44-8715-0E686EE35673}" type="datetimeFigureOut">
               <a:rPr lang="fr-FR" smtClean="0"/>
-              <a:t>27/03/2024</a:t>
+              <a:t>24/08/2024</a:t>
             </a:fld>
             <a:endParaRPr lang="fr-FR"/>
           </a:p>
@@ -2331,7 +2331,7 @@
           <a:p>
             <a:fld id="{77B41EF1-082E-9B44-8715-0E686EE35673}" type="datetimeFigureOut">
               <a:rPr lang="fr-FR" smtClean="0"/>
-              <a:t>27/03/2024</a:t>
+              <a:t>24/08/2024</a:t>
             </a:fld>
             <a:endParaRPr lang="fr-FR"/>
           </a:p>
@@ -2444,7 +2444,7 @@
           <a:p>
             <a:fld id="{77B41EF1-082E-9B44-8715-0E686EE35673}" type="datetimeFigureOut">
               <a:rPr lang="fr-FR" smtClean="0"/>
-              <a:t>27/03/2024</a:t>
+              <a:t>24/08/2024</a:t>
             </a:fld>
             <a:endParaRPr lang="fr-FR"/>
           </a:p>
@@ -2755,7 +2755,7 @@
           <a:p>
             <a:fld id="{77B41EF1-082E-9B44-8715-0E686EE35673}" type="datetimeFigureOut">
               <a:rPr lang="fr-FR" smtClean="0"/>
-              <a:t>27/03/2024</a:t>
+              <a:t>24/08/2024</a:t>
             </a:fld>
             <a:endParaRPr lang="fr-FR"/>
           </a:p>
@@ -3043,7 +3043,7 @@
           <a:p>
             <a:fld id="{77B41EF1-082E-9B44-8715-0E686EE35673}" type="datetimeFigureOut">
               <a:rPr lang="fr-FR" smtClean="0"/>
-              <a:t>27/03/2024</a:t>
+              <a:t>24/08/2024</a:t>
             </a:fld>
             <a:endParaRPr lang="fr-FR"/>
           </a:p>
@@ -3284,7 +3284,7 @@
           <a:p>
             <a:fld id="{77B41EF1-082E-9B44-8715-0E686EE35673}" type="datetimeFigureOut">
               <a:rPr lang="fr-FR" smtClean="0"/>
-              <a:t>27/03/2024</a:t>
+              <a:t>24/08/2024</a:t>
             </a:fld>
             <a:endParaRPr lang="fr-FR"/>
           </a:p>
@@ -5737,8 +5737,8 @@
         </p:nvSpPr>
         <p:spPr>
           <a:xfrm>
-            <a:off x="2553321" y="6503253"/>
-            <a:ext cx="7085357" cy="369332"/>
+            <a:off x="1094347" y="6480605"/>
+            <a:ext cx="10523299" cy="307777"/>
           </a:xfrm>
           <a:prstGeom prst="rect">
             <a:avLst/>
@@ -5751,9 +5751,34 @@
           </a:bodyPr>
           <a:lstStyle/>
           <a:p>
-            <a:r>
-              <a:rPr lang="fr-FR" dirty="0"/>
-              <a:t>Lien de la veille technologique : </a:t>
+            <a:pPr algn="ctr"/>
+            <a:r>
+              <a:rPr lang="fr-FR" sz="1400" dirty="0"/>
+              <a:t>Lien du Kanban : https://</a:t>
+            </a:r>
+            <a:r>
+              <a:rPr lang="fr-FR" sz="1400" dirty="0" err="1"/>
+              <a:t>cocumathieus-team.monday.com</a:t>
+            </a:r>
+            <a:r>
+              <a:rPr lang="fr-FR" sz="1400" dirty="0"/>
+              <a:t>/</a:t>
+            </a:r>
+            <a:r>
+              <a:rPr lang="fr-FR" sz="1400" dirty="0" err="1"/>
+              <a:t>boards</a:t>
+            </a:r>
+            <a:r>
+              <a:rPr lang="fr-FR" sz="1400" dirty="0"/>
+              <a:t>/1383412597/</a:t>
+            </a:r>
+            <a:r>
+              <a:rPr lang="fr-FR" sz="1400" dirty="0" err="1"/>
+              <a:t>views</a:t>
+            </a:r>
+            <a:r>
+              <a:rPr lang="fr-FR" sz="1400" dirty="0"/>
+              <a:t>/11132413 </a:t>
             </a:r>
           </a:p>
         </p:txBody>

</xml_diff>